<commit_message>
finaly was able to inject text
</commit_message>
<xml_diff>
--- a/explorations/test_powerpoint.pptx
+++ b/explorations/test_powerpoint.pptx
@@ -5,7 +5,8 @@
     <p:sldMasterId id="2147483648" r:id="rId1"/>
   </p:sldMasterIdLst>
   <p:sldIdLst>
-    <p:sldId id="356" r:id="rId2"/>
+    <p:sldId id="360" r:id="rId2"/>
+    <p:sldId id="361" r:id="rId3"/>
   </p:sldIdLst>
   <p:sldSz cx="12192000" cy="6858000"/>
   <p:notesSz cx="6858000" cy="9144000"/>
@@ -104,6 +105,11 @@
       </a:defRPr>
     </a:lvl9pPr>
   </p:defaultTextStyle>
+  <p:extLst>
+    <p:ext uri="{EFAFB233-063F-42B5-8137-9DF3F51BA10A}">
+      <p15:sldGuideLst xmlns:p15="http://schemas.microsoft.com/office/powerpoint/2012/main"/>
+    </p:ext>
+  </p:extLst>
 </p:presentation>
 </file>
 
@@ -256,7 +262,7 @@
           <a:p>
             <a:fld id="{2288EE2A-6C9E-F842-ACB2-1021F37E0B43}" type="datetimeFigureOut">
               <a:rPr lang="en-CH" smtClean="0"/>
-              <a:t>20.11.20</a:t>
+              <a:t>21.11.20</a:t>
             </a:fld>
             <a:endParaRPr lang="en-CH"/>
           </a:p>
@@ -456,7 +462,7 @@
           <a:p>
             <a:fld id="{2288EE2A-6C9E-F842-ACB2-1021F37E0B43}" type="datetimeFigureOut">
               <a:rPr lang="en-CH" smtClean="0"/>
-              <a:t>20.11.20</a:t>
+              <a:t>21.11.20</a:t>
             </a:fld>
             <a:endParaRPr lang="en-CH"/>
           </a:p>
@@ -666,7 +672,7 @@
           <a:p>
             <a:fld id="{2288EE2A-6C9E-F842-ACB2-1021F37E0B43}" type="datetimeFigureOut">
               <a:rPr lang="en-CH" smtClean="0"/>
-              <a:t>20.11.20</a:t>
+              <a:t>21.11.20</a:t>
             </a:fld>
             <a:endParaRPr lang="en-CH"/>
           </a:p>
@@ -2473,7 +2479,7 @@
           <a:p>
             <a:fld id="{2288EE2A-6C9E-F842-ACB2-1021F37E0B43}" type="datetimeFigureOut">
               <a:rPr lang="en-CH" smtClean="0"/>
-              <a:t>20.11.20</a:t>
+              <a:t>21.11.20</a:t>
             </a:fld>
             <a:endParaRPr lang="en-CH"/>
           </a:p>
@@ -2749,7 +2755,7 @@
           <a:p>
             <a:fld id="{2288EE2A-6C9E-F842-ACB2-1021F37E0B43}" type="datetimeFigureOut">
               <a:rPr lang="en-CH" smtClean="0"/>
-              <a:t>20.11.20</a:t>
+              <a:t>21.11.20</a:t>
             </a:fld>
             <a:endParaRPr lang="en-CH"/>
           </a:p>
@@ -3017,7 +3023,7 @@
           <a:p>
             <a:fld id="{2288EE2A-6C9E-F842-ACB2-1021F37E0B43}" type="datetimeFigureOut">
               <a:rPr lang="en-CH" smtClean="0"/>
-              <a:t>20.11.20</a:t>
+              <a:t>21.11.20</a:t>
             </a:fld>
             <a:endParaRPr lang="en-CH"/>
           </a:p>
@@ -3432,7 +3438,7 @@
           <a:p>
             <a:fld id="{2288EE2A-6C9E-F842-ACB2-1021F37E0B43}" type="datetimeFigureOut">
               <a:rPr lang="en-CH" smtClean="0"/>
-              <a:t>20.11.20</a:t>
+              <a:t>21.11.20</a:t>
             </a:fld>
             <a:endParaRPr lang="en-CH"/>
           </a:p>
@@ -3574,7 +3580,7 @@
           <a:p>
             <a:fld id="{2288EE2A-6C9E-F842-ACB2-1021F37E0B43}" type="datetimeFigureOut">
               <a:rPr lang="en-CH" smtClean="0"/>
-              <a:t>20.11.20</a:t>
+              <a:t>21.11.20</a:t>
             </a:fld>
             <a:endParaRPr lang="en-CH"/>
           </a:p>
@@ -3687,7 +3693,7 @@
           <a:p>
             <a:fld id="{2288EE2A-6C9E-F842-ACB2-1021F37E0B43}" type="datetimeFigureOut">
               <a:rPr lang="en-CH" smtClean="0"/>
-              <a:t>20.11.20</a:t>
+              <a:t>21.11.20</a:t>
             </a:fld>
             <a:endParaRPr lang="en-CH"/>
           </a:p>
@@ -4000,7 +4006,7 @@
           <a:p>
             <a:fld id="{2288EE2A-6C9E-F842-ACB2-1021F37E0B43}" type="datetimeFigureOut">
               <a:rPr lang="en-CH" smtClean="0"/>
-              <a:t>20.11.20</a:t>
+              <a:t>21.11.20</a:t>
             </a:fld>
             <a:endParaRPr lang="en-CH"/>
           </a:p>
@@ -4289,7 +4295,7 @@
           <a:p>
             <a:fld id="{2288EE2A-6C9E-F842-ACB2-1021F37E0B43}" type="datetimeFigureOut">
               <a:rPr lang="en-CH" smtClean="0"/>
-              <a:t>20.11.20</a:t>
+              <a:t>21.11.20</a:t>
             </a:fld>
             <a:endParaRPr lang="en-CH"/>
           </a:p>
@@ -4532,7 +4538,7 @@
           <a:p>
             <a:fld id="{2288EE2A-6C9E-F842-ACB2-1021F37E0B43}" type="datetimeFigureOut">
               <a:rPr lang="en-CH" smtClean="0"/>
-              <a:t>20.11.20</a:t>
+              <a:t>21.11.20</a:t>
             </a:fld>
             <a:endParaRPr lang="en-CH"/>
           </a:p>
@@ -4952,13 +4958,7 @@
       </p:grpSpPr>
       <p:sp>
         <p:nvSpPr>
-          <p:cNvPr id="2" name="Picture Placeholder 1">
-            <a:extLst>
-              <a:ext uri="{FF2B5EF4-FFF2-40B4-BE49-F238E27FC236}">
-                <a16:creationId xmlns:a16="http://schemas.microsoft.com/office/drawing/2014/main" id="{9DF263F3-3185-EB44-8DED-BF90106F737E}"/>
-              </a:ext>
-            </a:extLst>
-          </p:cNvPr>
+          <p:cNvPr id="2" name="Picture Placeholder 1"/>
           <p:cNvSpPr>
             <a:spLocks noGrp="1"/>
           </p:cNvSpPr>
@@ -4967,16 +4967,17 @@
           </p:nvPr>
         </p:nvSpPr>
         <p:spPr/>
-      </p:sp>
-      <p:sp>
-        <p:nvSpPr>
-          <p:cNvPr id="3" name="Text Placeholder 2">
-            <a:extLst>
-              <a:ext uri="{FF2B5EF4-FFF2-40B4-BE49-F238E27FC236}">
-                <a16:creationId xmlns:a16="http://schemas.microsoft.com/office/drawing/2014/main" id="{5447D0D3-A081-2E49-BA30-F835ADF5516D}"/>
-              </a:ext>
-            </a:extLst>
-          </p:cNvPr>
+        <p:txBody>
+          <a:bodyPr/>
+          <a:lstStyle/>
+          <a:p>
+            <a:endParaRPr/>
+          </a:p>
+        </p:txBody>
+      </p:sp>
+      <p:sp>
+        <p:nvSpPr>
+          <p:cNvPr id="3" name="Text Placeholder 2"/>
           <p:cNvSpPr>
             <a:spLocks noGrp="1"/>
           </p:cNvSpPr>
@@ -4989,19 +4990,15 @@
           <a:bodyPr/>
           <a:lstStyle/>
           <a:p>
-            <a:endParaRPr lang="en-CH"/>
-          </a:p>
-        </p:txBody>
-      </p:sp>
-      <p:sp>
-        <p:nvSpPr>
-          <p:cNvPr id="4" name="Text Placeholder 3">
-            <a:extLst>
-              <a:ext uri="{FF2B5EF4-FFF2-40B4-BE49-F238E27FC236}">
-                <a16:creationId xmlns:a16="http://schemas.microsoft.com/office/drawing/2014/main" id="{8084E4AE-EF0E-B445-8C45-0C07F4A70E91}"/>
-              </a:ext>
-            </a:extLst>
-          </p:cNvPr>
+            <a:r>
+              <a:t>I have been inserted with python</a:t>
+            </a:r>
+          </a:p>
+        </p:txBody>
+      </p:sp>
+      <p:sp>
+        <p:nvSpPr>
+          <p:cNvPr id="4" name="Text Placeholder 3"/>
           <p:cNvSpPr>
             <a:spLocks noGrp="1"/>
           </p:cNvSpPr>
@@ -5014,19 +5011,13 @@
           <a:bodyPr/>
           <a:lstStyle/>
           <a:p>
-            <a:endParaRPr lang="en-CH"/>
-          </a:p>
-        </p:txBody>
-      </p:sp>
-      <p:sp>
-        <p:nvSpPr>
-          <p:cNvPr id="5" name="Text Placeholder 4">
-            <a:extLst>
-              <a:ext uri="{FF2B5EF4-FFF2-40B4-BE49-F238E27FC236}">
-                <a16:creationId xmlns:a16="http://schemas.microsoft.com/office/drawing/2014/main" id="{CCA68EAF-E500-834E-BDA5-D26C4BC92DD4}"/>
-              </a:ext>
-            </a:extLst>
-          </p:cNvPr>
+            <a:endParaRPr/>
+          </a:p>
+        </p:txBody>
+      </p:sp>
+      <p:sp>
+        <p:nvSpPr>
+          <p:cNvPr id="5" name="Text Placeholder 4"/>
           <p:cNvSpPr>
             <a:spLocks noGrp="1"/>
           </p:cNvSpPr>
@@ -5039,19 +5030,13 @@
           <a:bodyPr/>
           <a:lstStyle/>
           <a:p>
-            <a:endParaRPr lang="en-CH"/>
-          </a:p>
-        </p:txBody>
-      </p:sp>
-      <p:sp>
-        <p:nvSpPr>
-          <p:cNvPr id="6" name="Picture Placeholder 5">
-            <a:extLst>
-              <a:ext uri="{FF2B5EF4-FFF2-40B4-BE49-F238E27FC236}">
-                <a16:creationId xmlns:a16="http://schemas.microsoft.com/office/drawing/2014/main" id="{64971DBE-4847-F540-9B8A-0324D92E3ABB}"/>
-              </a:ext>
-            </a:extLst>
-          </p:cNvPr>
+            <a:endParaRPr/>
+          </a:p>
+        </p:txBody>
+      </p:sp>
+      <p:sp>
+        <p:nvSpPr>
+          <p:cNvPr id="6" name="Picture Placeholder 5"/>
           <p:cNvSpPr>
             <a:spLocks noGrp="1"/>
           </p:cNvSpPr>
@@ -5060,13 +5045,136 @@
           </p:nvPr>
         </p:nvSpPr>
         <p:spPr/>
+        <p:txBody>
+          <a:bodyPr/>
+          <a:lstStyle/>
+          <a:p>
+            <a:endParaRPr/>
+          </a:p>
+        </p:txBody>
       </p:sp>
     </p:spTree>
-    <p:extLst>
-      <p:ext uri="{BB962C8B-B14F-4D97-AF65-F5344CB8AC3E}">
-        <p14:creationId xmlns:p14="http://schemas.microsoft.com/office/powerpoint/2010/main" val="3823544443"/>
-      </p:ext>
-    </p:extLst>
+  </p:cSld>
+  <p:clrMapOvr>
+    <a:masterClrMapping/>
+  </p:clrMapOvr>
+</p:sld>
+</file>
+
+<file path=ppt/slides/slide2.xml><?xml version="1.0" encoding="utf-8"?>
+<p:sld xmlns:a="http://schemas.openxmlformats.org/drawingml/2006/main" xmlns:r="http://schemas.openxmlformats.org/officeDocument/2006/relationships" xmlns:p="http://schemas.openxmlformats.org/presentationml/2006/main">
+  <p:cSld>
+    <p:spTree>
+      <p:nvGrpSpPr>
+        <p:cNvPr id="1" name=""/>
+        <p:cNvGrpSpPr/>
+        <p:nvPr/>
+      </p:nvGrpSpPr>
+      <p:grpSpPr>
+        <a:xfrm>
+          <a:off x="0" y="0"/>
+          <a:ext cx="0" cy="0"/>
+          <a:chOff x="0" y="0"/>
+          <a:chExt cx="0" cy="0"/>
+        </a:xfrm>
+      </p:grpSpPr>
+      <p:pic>
+        <p:nvPicPr>
+          <p:cNvPr id="8" name="Picture Placeholder 7" descr="Table&#10;&#10;Description automatically generated">
+            <a:extLst>
+              <a:ext uri="{FF2B5EF4-FFF2-40B4-BE49-F238E27FC236}">
+                <a16:creationId xmlns:a16="http://schemas.microsoft.com/office/drawing/2014/main" id="{F2B4A038-E830-AD4E-A1FE-4AF37C3AFAC8}"/>
+              </a:ext>
+            </a:extLst>
+          </p:cNvPr>
+          <p:cNvPicPr>
+            <a:picLocks noGrp="1" noChangeAspect="1"/>
+          </p:cNvPicPr>
+          <p:nvPr>
+            <p:ph type="pic" sz="quarter" idx="24"/>
+          </p:nvPr>
+        </p:nvPicPr>
+        <p:blipFill>
+          <a:blip r:embed="rId2"/>
+          <a:srcRect l="18442" r="18442"/>
+          <a:stretch>
+            <a:fillRect/>
+          </a:stretch>
+        </p:blipFill>
+        <p:spPr/>
+      </p:pic>
+      <p:sp>
+        <p:nvSpPr>
+          <p:cNvPr id="3" name="Text Placeholder 2"/>
+          <p:cNvSpPr>
+            <a:spLocks noGrp="1"/>
+          </p:cNvSpPr>
+          <p:nvPr>
+            <p:ph type="body" sz="half" idx="25"/>
+          </p:nvPr>
+        </p:nvSpPr>
+        <p:spPr/>
+        <p:txBody>
+          <a:bodyPr/>
+          <a:lstStyle/>
+          <a:p>
+            <a:r>
+              <a:t>I have been inserted with python</a:t>
+            </a:r>
+          </a:p>
+        </p:txBody>
+      </p:sp>
+      <p:sp>
+        <p:nvSpPr>
+          <p:cNvPr id="4" name="Text Placeholder 3"/>
+          <p:cNvSpPr>
+            <a:spLocks noGrp="1"/>
+          </p:cNvSpPr>
+          <p:nvPr>
+            <p:ph type="body" sz="half" idx="26"/>
+          </p:nvPr>
+        </p:nvSpPr>
+        <p:spPr/>
+        <p:txBody>
+          <a:bodyPr/>
+          <a:lstStyle/>
+          <a:p>
+            <a:endParaRPr/>
+          </a:p>
+        </p:txBody>
+      </p:sp>
+      <p:sp>
+        <p:nvSpPr>
+          <p:cNvPr id="5" name="Text Placeholder 4"/>
+          <p:cNvSpPr>
+            <a:spLocks noGrp="1"/>
+          </p:cNvSpPr>
+          <p:nvPr>
+            <p:ph type="body" sz="half" idx="22"/>
+          </p:nvPr>
+        </p:nvSpPr>
+        <p:spPr/>
+        <p:txBody>
+          <a:bodyPr/>
+          <a:lstStyle/>
+          <a:p>
+            <a:endParaRPr/>
+          </a:p>
+        </p:txBody>
+      </p:sp>
+      <p:sp>
+        <p:nvSpPr>
+          <p:cNvPr id="6" name="Picture Placeholder 5"/>
+          <p:cNvSpPr>
+            <a:spLocks noGrp="1"/>
+          </p:cNvSpPr>
+          <p:nvPr>
+            <p:ph type="pic" sz="quarter" idx="27"/>
+          </p:nvPr>
+        </p:nvSpPr>
+        <p:spPr/>
+      </p:sp>
+    </p:spTree>
   </p:cSld>
   <p:clrMapOvr>
     <a:masterClrMapping/>

</xml_diff>